<commit_message>
feat: update executive summary ppt
</commit_message>
<xml_diff>
--- a/Summary.pptx
+++ b/Summary.pptx
@@ -4342,54 +4342,6 @@
           <a:chExt cx="0" cy="0"/>
         </a:xfrm>
       </p:grpSpPr>
-      <p:pic>
-        <p:nvPicPr>
-          <p:cNvPr id="3" name="Image 1" descr="preencoded.png"/>
-          <p:cNvPicPr>
-            <a:picLocks noChangeAspect="1"/>
-          </p:cNvPicPr>
-          <p:nvPr/>
-        </p:nvPicPr>
-        <p:blipFill>
-          <a:blip r:embed="rId3"/>
-          <a:stretch>
-            <a:fillRect/>
-          </a:stretch>
-        </p:blipFill>
-        <p:spPr>
-          <a:xfrm>
-            <a:off x="7452360" y="6062472"/>
-            <a:ext cx="6345936" cy="1088136"/>
-          </a:xfrm>
-          <a:prstGeom prst="rect">
-            <a:avLst/>
-          </a:prstGeom>
-        </p:spPr>
-      </p:pic>
-      <p:pic>
-        <p:nvPicPr>
-          <p:cNvPr id="4" name="Image 2" descr="preencoded.png"/>
-          <p:cNvPicPr>
-            <a:picLocks noChangeAspect="1"/>
-          </p:cNvPicPr>
-          <p:nvPr/>
-        </p:nvPicPr>
-        <p:blipFill>
-          <a:blip r:embed="rId3"/>
-          <a:stretch>
-            <a:fillRect/>
-          </a:stretch>
-        </p:blipFill>
-        <p:spPr>
-          <a:xfrm>
-            <a:off x="841248" y="6062472"/>
-            <a:ext cx="6345936" cy="1088136"/>
-          </a:xfrm>
-          <a:prstGeom prst="rect">
-            <a:avLst/>
-          </a:prstGeom>
-        </p:spPr>
-      </p:pic>
       <p:graphicFrame>
         <p:nvGraphicFramePr>
           <p:cNvPr id="14" name="Table 0"/>
@@ -4399,14 +4351,14 @@
           <p:nvPr>
             <p:extLst>
               <p:ext uri="{D42A27DB-BD31-4B8C-83A1-F6EECF244321}">
-                <p14:modId xmlns:p14="http://schemas.microsoft.com/office/powerpoint/2010/main" val="3245948498"/>
+                <p14:modId xmlns:p14="http://schemas.microsoft.com/office/powerpoint/2010/main" val="375964582"/>
               </p:ext>
             </p:extLst>
           </p:nvPr>
         </p:nvGraphicFramePr>
         <p:xfrm>
-          <a:off x="903890" y="2048256"/>
-          <a:ext cx="12876118" cy="3730752"/>
+          <a:off x="262759" y="2258777"/>
+          <a:ext cx="6947337" cy="4428114"/>
         </p:xfrm>
         <a:graphic>
           <a:graphicData uri="http://schemas.openxmlformats.org/drawingml/2006/table">
@@ -4415,21 +4367,21 @@
                 <a:tableStyleId>{ED083AE6-46FA-4A59-8FB0-9F97EB10719F}</a:tableStyleId>
               </a:tblPr>
               <a:tblGrid>
-                <a:gridCol w="4244182">
+                <a:gridCol w="2289957">
                   <a:extLst>
                     <a:ext uri="{9D8B030D-6E8A-4147-A177-3AD203B41FA5}">
                       <a16:colId xmlns:a16="http://schemas.microsoft.com/office/drawing/2014/main" val="20000"/>
                     </a:ext>
                   </a:extLst>
                 </a:gridCol>
-                <a:gridCol w="4315968">
+                <a:gridCol w="2328690">
                   <a:extLst>
                     <a:ext uri="{9D8B030D-6E8A-4147-A177-3AD203B41FA5}">
                       <a16:colId xmlns:a16="http://schemas.microsoft.com/office/drawing/2014/main" val="20001"/>
                     </a:ext>
                   </a:extLst>
                 </a:gridCol>
-                <a:gridCol w="4315968">
+                <a:gridCol w="2328690">
                   <a:extLst>
                     <a:ext uri="{9D8B030D-6E8A-4147-A177-3AD203B41FA5}">
                       <a16:colId xmlns:a16="http://schemas.microsoft.com/office/drawing/2014/main" val="20002"/>
@@ -4437,7 +4389,7 @@
                   </a:extLst>
                 </a:gridCol>
               </a:tblGrid>
-              <a:tr h="932688">
+              <a:tr h="1105749">
                 <a:tc>
                   <a:txBody>
                     <a:bodyPr/>
@@ -4537,7 +4489,7 @@
                   </a:ext>
                 </a:extLst>
               </a:tr>
-              <a:tr h="932688">
+              <a:tr h="1105749">
                 <a:tc>
                   <a:txBody>
                     <a:bodyPr/>
@@ -4616,7 +4568,7 @@
                   </a:ext>
                 </a:extLst>
               </a:tr>
-              <a:tr h="932688">
+              <a:tr h="1105749">
                 <a:tc>
                   <a:txBody>
                     <a:bodyPr/>
@@ -4695,7 +4647,7 @@
                   </a:ext>
                 </a:extLst>
               </a:tr>
-              <a:tr h="932688">
+              <a:tr h="1110867">
                 <a:tc>
                   <a:txBody>
                     <a:bodyPr/>
@@ -4778,174 +4730,6 @@
           </a:graphicData>
         </a:graphic>
       </p:graphicFrame>
-      <p:sp>
-        <p:nvSpPr>
-          <p:cNvPr id="7" name="Text 1"/>
-          <p:cNvSpPr/>
-          <p:nvPr/>
-        </p:nvSpPr>
-        <p:spPr>
-          <a:xfrm>
-            <a:off x="1078992" y="6181344"/>
-            <a:ext cx="5870448" cy="356616"/>
-          </a:xfrm>
-          <a:prstGeom prst="rect">
-            <a:avLst/>
-          </a:prstGeom>
-          <a:noFill/>
-          <a:ln/>
-        </p:spPr>
-        <p:txBody>
-          <a:bodyPr wrap="none" lIns="0" tIns="0" rIns="0" bIns="0" rtlCol="0" anchor="ctr"/>
-          <a:lstStyle/>
-          <a:p>
-            <a:pPr marL="0" indent="0" algn="ctr">
-              <a:lnSpc>
-                <a:spcPts val="2780"/>
-              </a:lnSpc>
-              <a:buNone/>
-            </a:pPr>
-            <a:r>
-              <a:rPr lang="en-US" sz="2320" dirty="0">
-                <a:solidFill>
-                  <a:srgbClr val="464646"/>
-                </a:solidFill>
-                <a:latin typeface="Roboto-Roboto-Bold" pitchFamily="34" charset="0"/>
-                <a:ea typeface="Roboto-Roboto-Bold" pitchFamily="34" charset="-122"/>
-                <a:cs typeface="Roboto-Roboto-Bold" pitchFamily="34" charset="-120"/>
-              </a:rPr>
-              <a:t>📈 NN Advantage</a:t>
-            </a:r>
-            <a:endParaRPr lang="en-US" sz="2320" dirty="0"/>
-          </a:p>
-        </p:txBody>
-      </p:sp>
-      <p:sp>
-        <p:nvSpPr>
-          <p:cNvPr id="8" name="Text 2"/>
-          <p:cNvSpPr/>
-          <p:nvPr/>
-        </p:nvSpPr>
-        <p:spPr>
-          <a:xfrm>
-            <a:off x="7690104" y="6675120"/>
-            <a:ext cx="5870448" cy="356616"/>
-          </a:xfrm>
-          <a:prstGeom prst="rect">
-            <a:avLst/>
-          </a:prstGeom>
-          <a:noFill/>
-          <a:ln/>
-        </p:spPr>
-        <p:txBody>
-          <a:bodyPr wrap="none" lIns="0" tIns="0" rIns="0" bIns="0" rtlCol="0" anchor="ctr"/>
-          <a:lstStyle/>
-          <a:p>
-            <a:pPr marL="0" indent="0" algn="ctr">
-              <a:lnSpc>
-                <a:spcPts val="2780"/>
-              </a:lnSpc>
-              <a:buNone/>
-            </a:pPr>
-            <a:r>
-              <a:rPr lang="en-US" sz="1850" dirty="0">
-                <a:solidFill>
-                  <a:srgbClr val="464646"/>
-                </a:solidFill>
-                <a:latin typeface="Roboto-Roboto-Bold" pitchFamily="34" charset="0"/>
-                <a:ea typeface="Roboto-Roboto-Bold" pitchFamily="34" charset="-122"/>
-                <a:cs typeface="Roboto-Roboto-Bold" pitchFamily="34" charset="-120"/>
-              </a:rPr>
-              <a:t> Stable performance suits massive access scenarios.</a:t>
-            </a:r>
-            <a:endParaRPr lang="en-US" sz="1850" dirty="0"/>
-          </a:p>
-        </p:txBody>
-      </p:sp>
-      <p:sp>
-        <p:nvSpPr>
-          <p:cNvPr id="9" name="Text 3"/>
-          <p:cNvSpPr/>
-          <p:nvPr/>
-        </p:nvSpPr>
-        <p:spPr>
-          <a:xfrm>
-            <a:off x="1078992" y="6675120"/>
-            <a:ext cx="5870448" cy="356616"/>
-          </a:xfrm>
-          <a:prstGeom prst="rect">
-            <a:avLst/>
-          </a:prstGeom>
-          <a:noFill/>
-          <a:ln/>
-        </p:spPr>
-        <p:txBody>
-          <a:bodyPr wrap="none" lIns="0" tIns="0" rIns="0" bIns="0" rtlCol="0" anchor="ctr"/>
-          <a:lstStyle/>
-          <a:p>
-            <a:pPr marL="0" indent="0" algn="ctr">
-              <a:lnSpc>
-                <a:spcPts val="2780"/>
-              </a:lnSpc>
-              <a:buNone/>
-            </a:pPr>
-            <a:r>
-              <a:rPr lang="en-US" sz="1850" dirty="0">
-                <a:solidFill>
-                  <a:srgbClr val="464646"/>
-                </a:solidFill>
-                <a:latin typeface="Roboto-Roboto-Bold" pitchFamily="34" charset="0"/>
-                <a:ea typeface="Roboto-Roboto-Bold" pitchFamily="34" charset="-122"/>
-                <a:cs typeface="Roboto-Roboto-Bold" pitchFamily="34" charset="-120"/>
-              </a:rPr>
-              <a:t> 9.37% higher throughput, 86.2% lower variance.</a:t>
-            </a:r>
-            <a:endParaRPr lang="en-US" sz="1850" dirty="0"/>
-          </a:p>
-        </p:txBody>
-      </p:sp>
-      <p:sp>
-        <p:nvSpPr>
-          <p:cNvPr id="10" name="Text 4"/>
-          <p:cNvSpPr/>
-          <p:nvPr/>
-        </p:nvSpPr>
-        <p:spPr>
-          <a:xfrm>
-            <a:off x="7690104" y="6181344"/>
-            <a:ext cx="5870448" cy="356616"/>
-          </a:xfrm>
-          <a:prstGeom prst="rect">
-            <a:avLst/>
-          </a:prstGeom>
-          <a:noFill/>
-          <a:ln/>
-        </p:spPr>
-        <p:txBody>
-          <a:bodyPr wrap="none" lIns="0" tIns="0" rIns="0" bIns="0" rtlCol="0" anchor="ctr"/>
-          <a:lstStyle/>
-          <a:p>
-            <a:pPr marL="0" indent="0" algn="ctr">
-              <a:lnSpc>
-                <a:spcPts val="2780"/>
-              </a:lnSpc>
-              <a:buNone/>
-            </a:pPr>
-            <a:r>
-              <a:rPr lang="en-US" sz="2320" dirty="0">
-                <a:solidFill>
-                  <a:srgbClr val="464646"/>
-                </a:solidFill>
-                <a:latin typeface="Roboto-Roboto-Bold" pitchFamily="34" charset="0"/>
-                <a:ea typeface="Roboto-Roboto-Bold" pitchFamily="34" charset="-122"/>
-                <a:cs typeface="Roboto-Roboto-Bold" pitchFamily="34" charset="-120"/>
-              </a:rPr>
-              <a:t>📉 Scalability</a:t>
-            </a:r>
-            <a:endParaRPr lang="en-US" sz="2320" dirty="0"/>
-          </a:p>
-        </p:txBody>
-      </p:sp>
       <p:pic>
         <p:nvPicPr>
           <p:cNvPr id="5" name="Image 2" descr="preencoded.png">
@@ -4961,15 +4745,15 @@
           <p:nvPr/>
         </p:nvPicPr>
         <p:blipFill>
-          <a:blip r:embed="rId4"/>
+          <a:blip r:embed="rId3"/>
           <a:stretch>
             <a:fillRect/>
           </a:stretch>
         </p:blipFill>
         <p:spPr>
           <a:xfrm>
-            <a:off x="139577" y="118872"/>
-            <a:ext cx="1896270" cy="1667887"/>
+            <a:off x="139577" y="118873"/>
+            <a:ext cx="1555230" cy="1124921"/>
           </a:xfrm>
           <a:prstGeom prst="rect">
             <a:avLst/>
@@ -4990,8 +4774,8 @@
         </p:nvSpPr>
         <p:spPr>
           <a:xfrm>
-            <a:off x="452102" y="584690"/>
-            <a:ext cx="1290355" cy="713232"/>
+            <a:off x="452102" y="481583"/>
+            <a:ext cx="719801" cy="450579"/>
           </a:xfrm>
           <a:prstGeom prst="rect">
             <a:avLst/>
@@ -5038,8 +4822,8 @@
         </p:nvSpPr>
         <p:spPr>
           <a:xfrm>
-            <a:off x="2217368" y="530562"/>
-            <a:ext cx="7304691" cy="713232"/>
+            <a:off x="1970376" y="350256"/>
+            <a:ext cx="2265294" cy="713232"/>
           </a:xfrm>
           <a:prstGeom prst="rect">
             <a:avLst/>
@@ -5108,6 +4892,36 @@
           </a:p>
         </p:txBody>
       </p:sp>
+      <p:pic>
+        <p:nvPicPr>
+          <p:cNvPr id="6" name="Picture 5">
+            <a:extLst>
+              <a:ext uri="{FF2B5EF4-FFF2-40B4-BE49-F238E27FC236}">
+                <a16:creationId xmlns:a16="http://schemas.microsoft.com/office/drawing/2014/main" id="{809D6FB1-60DC-8465-2B6D-8624DCCB174A}"/>
+              </a:ext>
+            </a:extLst>
+          </p:cNvPr>
+          <p:cNvPicPr>
+            <a:picLocks noChangeAspect="1"/>
+          </p:cNvPicPr>
+          <p:nvPr/>
+        </p:nvPicPr>
+        <p:blipFill>
+          <a:blip r:embed="rId4"/>
+          <a:stretch>
+            <a:fillRect/>
+          </a:stretch>
+        </p:blipFill>
+        <p:spPr>
+          <a:xfrm>
+            <a:off x="7620001" y="2258777"/>
+            <a:ext cx="6784427" cy="4428114"/>
+          </a:xfrm>
+          <a:prstGeom prst="rect">
+            <a:avLst/>
+          </a:prstGeom>
+        </p:spPr>
+      </p:pic>
     </p:spTree>
   </p:cSld>
   <p:clrMapOvr>

</xml_diff>